<commit_message>
Subject: lab 6 ppt update
</commit_message>
<xml_diff>
--- a/lab6/CS6650 Lab 6.pptx
+++ b/lab6/CS6650 Lab 6.pptx
@@ -8,6 +8,15 @@
     <p:sldId id="256" r:id="rId2"/>
     <p:sldId id="257" r:id="rId3"/>
     <p:sldId id="258" r:id="rId4"/>
+    <p:sldId id="261" r:id="rId5"/>
+    <p:sldId id="260" r:id="rId6"/>
+    <p:sldId id="262" r:id="rId7"/>
+    <p:sldId id="263" r:id="rId8"/>
+    <p:sldId id="264" r:id="rId9"/>
+    <p:sldId id="266" r:id="rId10"/>
+    <p:sldId id="265" r:id="rId11"/>
+    <p:sldId id="267" r:id="rId12"/>
+    <p:sldId id="268" r:id="rId13"/>
   </p:sldIdLst>
   <p:sldSz cx="12192000" cy="6858000"/>
   <p:notesSz cx="6858000" cy="9144000"/>
@@ -3434,6 +3443,415 @@
 </p:sld>
 </file>
 
+<file path=ppt/slides/slide10.xml><?xml version="1.0" encoding="utf-8"?>
+<p:sld xmlns:a="http://schemas.openxmlformats.org/drawingml/2006/main" xmlns:r="http://schemas.openxmlformats.org/officeDocument/2006/relationships" xmlns:p="http://schemas.openxmlformats.org/presentationml/2006/main">
+  <p:cSld>
+    <p:spTree>
+      <p:nvGrpSpPr>
+        <p:cNvPr id="1" name=""/>
+        <p:cNvGrpSpPr/>
+        <p:nvPr/>
+      </p:nvGrpSpPr>
+      <p:grpSpPr>
+        <a:xfrm>
+          <a:off x="0" y="0"/>
+          <a:ext cx="0" cy="0"/>
+          <a:chOff x="0" y="0"/>
+          <a:chExt cx="0" cy="0"/>
+        </a:xfrm>
+      </p:grpSpPr>
+      <p:sp>
+        <p:nvSpPr>
+          <p:cNvPr id="9" name="Título 1">
+            <a:extLst>
+              <a:ext uri="{FF2B5EF4-FFF2-40B4-BE49-F238E27FC236}">
+                <a16:creationId xmlns:a16="http://schemas.microsoft.com/office/drawing/2014/main" id="{9533C53A-F112-4A5D-B53E-BA31F3497FB3}"/>
+              </a:ext>
+            </a:extLst>
+          </p:cNvPr>
+          <p:cNvSpPr txBox="1">
+            <a:spLocks/>
+          </p:cNvSpPr>
+          <p:nvPr/>
+        </p:nvSpPr>
+        <p:spPr>
+          <a:xfrm>
+            <a:off x="838200" y="441325"/>
+            <a:ext cx="10515600" cy="1325563"/>
+          </a:xfrm>
+          <a:prstGeom prst="rect">
+            <a:avLst/>
+          </a:prstGeom>
+        </p:spPr>
+        <p:txBody>
+          <a:bodyPr vert="horz" lIns="91440" tIns="45720" rIns="91440" bIns="45720" rtlCol="0" anchor="ctr">
+            <a:normAutofit/>
+          </a:bodyPr>
+          <a:lstStyle>
+            <a:lvl1pPr algn="l" defTabSz="914400" rtl="0" eaLnBrk="1" latinLnBrk="0" hangingPunct="1">
+              <a:lnSpc>
+                <a:spcPct val="90000"/>
+              </a:lnSpc>
+              <a:spcBef>
+                <a:spcPct val="0"/>
+              </a:spcBef>
+              <a:buNone/>
+              <a:defRPr sz="4400" kern="1200">
+                <a:solidFill>
+                  <a:schemeClr val="tx1"/>
+                </a:solidFill>
+                <a:latin typeface="+mj-lt"/>
+                <a:ea typeface="+mj-ea"/>
+                <a:cs typeface="+mj-cs"/>
+              </a:defRPr>
+            </a:lvl1pPr>
+          </a:lstStyle>
+          <a:p>
+            <a:r>
+              <a:rPr lang="es-CL" dirty="0"/>
+              <a:t>Case 256 </a:t>
+            </a:r>
+            <a:r>
+              <a:rPr lang="es-CL" dirty="0" err="1"/>
+              <a:t>threads</a:t>
+            </a:r>
+            <a:r>
+              <a:rPr lang="es-CL" dirty="0"/>
+              <a:t> -&gt; 20 </a:t>
+            </a:r>
+            <a:r>
+              <a:rPr lang="es-CL" dirty="0" err="1"/>
+              <a:t>mins</a:t>
+            </a:r>
+            <a:r>
+              <a:rPr lang="es-CL" dirty="0"/>
+              <a:t> </a:t>
+            </a:r>
+            <a:r>
+              <a:rPr lang="es-CL" dirty="0" err="1"/>
+              <a:t>to</a:t>
+            </a:r>
+            <a:r>
+              <a:rPr lang="es-CL" dirty="0"/>
+              <a:t> </a:t>
+            </a:r>
+            <a:r>
+              <a:rPr lang="es-CL" dirty="0" err="1"/>
+              <a:t>reach</a:t>
+            </a:r>
+            <a:r>
+              <a:rPr lang="es-CL" dirty="0"/>
+              <a:t> 70 k.</a:t>
+            </a:r>
+            <a:endParaRPr lang="en-US" dirty="0"/>
+          </a:p>
+        </p:txBody>
+      </p:sp>
+      <p:pic>
+        <p:nvPicPr>
+          <p:cNvPr id="3" name="Imagen 2">
+            <a:extLst>
+              <a:ext uri="{FF2B5EF4-FFF2-40B4-BE49-F238E27FC236}">
+                <a16:creationId xmlns:a16="http://schemas.microsoft.com/office/drawing/2014/main" id="{01E79D2C-DC2A-45BF-8F66-68DD1B0B2C7A}"/>
+              </a:ext>
+            </a:extLst>
+          </p:cNvPr>
+          <p:cNvPicPr>
+            <a:picLocks noChangeAspect="1"/>
+          </p:cNvPicPr>
+          <p:nvPr/>
+        </p:nvPicPr>
+        <p:blipFill>
+          <a:blip r:embed="rId2"/>
+          <a:stretch>
+            <a:fillRect/>
+          </a:stretch>
+        </p:blipFill>
+        <p:spPr>
+          <a:xfrm>
+            <a:off x="1209675" y="1927225"/>
+            <a:ext cx="8277427" cy="3927475"/>
+          </a:xfrm>
+          <a:prstGeom prst="rect">
+            <a:avLst/>
+          </a:prstGeom>
+        </p:spPr>
+      </p:pic>
+    </p:spTree>
+    <p:extLst>
+      <p:ext uri="{BB962C8B-B14F-4D97-AF65-F5344CB8AC3E}">
+        <p14:creationId xmlns:p14="http://schemas.microsoft.com/office/powerpoint/2010/main" val="1461261644"/>
+      </p:ext>
+    </p:extLst>
+  </p:cSld>
+  <p:clrMapOvr>
+    <a:masterClrMapping/>
+  </p:clrMapOvr>
+</p:sld>
+</file>
+
+<file path=ppt/slides/slide11.xml><?xml version="1.0" encoding="utf-8"?>
+<p:sld xmlns:a="http://schemas.openxmlformats.org/drawingml/2006/main" xmlns:r="http://schemas.openxmlformats.org/officeDocument/2006/relationships" xmlns:p="http://schemas.openxmlformats.org/presentationml/2006/main">
+  <p:cSld>
+    <p:spTree>
+      <p:nvGrpSpPr>
+        <p:cNvPr id="1" name=""/>
+        <p:cNvGrpSpPr/>
+        <p:nvPr/>
+      </p:nvGrpSpPr>
+      <p:grpSpPr>
+        <a:xfrm>
+          <a:off x="0" y="0"/>
+          <a:ext cx="0" cy="0"/>
+          <a:chOff x="0" y="0"/>
+          <a:chExt cx="0" cy="0"/>
+        </a:xfrm>
+      </p:grpSpPr>
+      <p:sp>
+        <p:nvSpPr>
+          <p:cNvPr id="2" name="Título 1">
+            <a:extLst>
+              <a:ext uri="{FF2B5EF4-FFF2-40B4-BE49-F238E27FC236}">
+                <a16:creationId xmlns:a16="http://schemas.microsoft.com/office/drawing/2014/main" id="{40369D93-2209-448E-86CD-1D15193BB598}"/>
+              </a:ext>
+            </a:extLst>
+          </p:cNvPr>
+          <p:cNvSpPr>
+            <a:spLocks noGrp="1"/>
+          </p:cNvSpPr>
+          <p:nvPr>
+            <p:ph type="title"/>
+          </p:nvPr>
+        </p:nvSpPr>
+        <p:spPr/>
+        <p:txBody>
+          <a:bodyPr/>
+          <a:lstStyle/>
+          <a:p>
+            <a:r>
+              <a:rPr lang="es-CL" dirty="0"/>
+              <a:t>Case 512 </a:t>
+            </a:r>
+            <a:r>
+              <a:rPr lang="es-CL" dirty="0" err="1"/>
+              <a:t>threads</a:t>
+            </a:r>
+            <a:r>
+              <a:rPr lang="es-CL" dirty="0"/>
+              <a:t> -&gt; </a:t>
+            </a:r>
+            <a:r>
+              <a:rPr lang="es-CL" dirty="0" err="1"/>
+              <a:t>collapse</a:t>
+            </a:r>
+            <a:endParaRPr lang="en-US" dirty="0"/>
+          </a:p>
+        </p:txBody>
+      </p:sp>
+      <p:pic>
+        <p:nvPicPr>
+          <p:cNvPr id="6" name="Imagen 5">
+            <a:extLst>
+              <a:ext uri="{FF2B5EF4-FFF2-40B4-BE49-F238E27FC236}">
+                <a16:creationId xmlns:a16="http://schemas.microsoft.com/office/drawing/2014/main" id="{5E823A33-618E-4CF6-B9A9-7A84ED43A61D}"/>
+              </a:ext>
+            </a:extLst>
+          </p:cNvPr>
+          <p:cNvPicPr>
+            <a:picLocks noChangeAspect="1"/>
+          </p:cNvPicPr>
+          <p:nvPr/>
+        </p:nvPicPr>
+        <p:blipFill>
+          <a:blip r:embed="rId2"/>
+          <a:stretch>
+            <a:fillRect/>
+          </a:stretch>
+        </p:blipFill>
+        <p:spPr>
+          <a:xfrm>
+            <a:off x="5654675" y="4184269"/>
+            <a:ext cx="5445125" cy="2308606"/>
+          </a:xfrm>
+          <a:prstGeom prst="rect">
+            <a:avLst/>
+          </a:prstGeom>
+        </p:spPr>
+      </p:pic>
+      <p:pic>
+        <p:nvPicPr>
+          <p:cNvPr id="8" name="Imagen 7">
+            <a:extLst>
+              <a:ext uri="{FF2B5EF4-FFF2-40B4-BE49-F238E27FC236}">
+                <a16:creationId xmlns:a16="http://schemas.microsoft.com/office/drawing/2014/main" id="{5EAD10D3-FBA9-400E-876B-B6F8BE00F2CB}"/>
+              </a:ext>
+            </a:extLst>
+          </p:cNvPr>
+          <p:cNvPicPr>
+            <a:picLocks noChangeAspect="1"/>
+          </p:cNvPicPr>
+          <p:nvPr/>
+        </p:nvPicPr>
+        <p:blipFill>
+          <a:blip r:embed="rId3"/>
+          <a:stretch>
+            <a:fillRect/>
+          </a:stretch>
+        </p:blipFill>
+        <p:spPr>
+          <a:xfrm>
+            <a:off x="473075" y="2011527"/>
+            <a:ext cx="5622925" cy="2192173"/>
+          </a:xfrm>
+          <a:prstGeom prst="rect">
+            <a:avLst/>
+          </a:prstGeom>
+        </p:spPr>
+      </p:pic>
+    </p:spTree>
+    <p:extLst>
+      <p:ext uri="{BB962C8B-B14F-4D97-AF65-F5344CB8AC3E}">
+        <p14:creationId xmlns:p14="http://schemas.microsoft.com/office/powerpoint/2010/main" val="2769348240"/>
+      </p:ext>
+    </p:extLst>
+  </p:cSld>
+  <p:clrMapOvr>
+    <a:masterClrMapping/>
+  </p:clrMapOvr>
+</p:sld>
+</file>
+
+<file path=ppt/slides/slide12.xml><?xml version="1.0" encoding="utf-8"?>
+<p:sld xmlns:a="http://schemas.openxmlformats.org/drawingml/2006/main" xmlns:r="http://schemas.openxmlformats.org/officeDocument/2006/relationships" xmlns:p="http://schemas.openxmlformats.org/presentationml/2006/main">
+  <p:cSld>
+    <p:spTree>
+      <p:nvGrpSpPr>
+        <p:cNvPr id="1" name=""/>
+        <p:cNvGrpSpPr/>
+        <p:nvPr/>
+      </p:nvGrpSpPr>
+      <p:grpSpPr>
+        <a:xfrm>
+          <a:off x="0" y="0"/>
+          <a:ext cx="0" cy="0"/>
+          <a:chOff x="0" y="0"/>
+          <a:chExt cx="0" cy="0"/>
+        </a:xfrm>
+      </p:grpSpPr>
+      <p:sp>
+        <p:nvSpPr>
+          <p:cNvPr id="9" name="Título 1">
+            <a:extLst>
+              <a:ext uri="{FF2B5EF4-FFF2-40B4-BE49-F238E27FC236}">
+                <a16:creationId xmlns:a16="http://schemas.microsoft.com/office/drawing/2014/main" id="{9533C53A-F112-4A5D-B53E-BA31F3497FB3}"/>
+              </a:ext>
+            </a:extLst>
+          </p:cNvPr>
+          <p:cNvSpPr txBox="1">
+            <a:spLocks/>
+          </p:cNvSpPr>
+          <p:nvPr/>
+        </p:nvSpPr>
+        <p:spPr>
+          <a:xfrm>
+            <a:off x="838200" y="441325"/>
+            <a:ext cx="10515600" cy="1325563"/>
+          </a:xfrm>
+          <a:prstGeom prst="rect">
+            <a:avLst/>
+          </a:prstGeom>
+        </p:spPr>
+        <p:txBody>
+          <a:bodyPr vert="horz" lIns="91440" tIns="45720" rIns="91440" bIns="45720" rtlCol="0" anchor="ctr">
+            <a:normAutofit/>
+          </a:bodyPr>
+          <a:lstStyle>
+            <a:lvl1pPr algn="l" defTabSz="914400" rtl="0" eaLnBrk="1" latinLnBrk="0" hangingPunct="1">
+              <a:lnSpc>
+                <a:spcPct val="90000"/>
+              </a:lnSpc>
+              <a:spcBef>
+                <a:spcPct val="0"/>
+              </a:spcBef>
+              <a:buNone/>
+              <a:defRPr sz="4400" kern="1200">
+                <a:solidFill>
+                  <a:schemeClr val="tx1"/>
+                </a:solidFill>
+                <a:latin typeface="+mj-lt"/>
+                <a:ea typeface="+mj-ea"/>
+                <a:cs typeface="+mj-cs"/>
+              </a:defRPr>
+            </a:lvl1pPr>
+          </a:lstStyle>
+          <a:p>
+            <a:r>
+              <a:rPr lang="es-CL" dirty="0"/>
+              <a:t>Case 512 </a:t>
+            </a:r>
+            <a:r>
+              <a:rPr lang="es-CL" dirty="0" err="1"/>
+              <a:t>threads</a:t>
+            </a:r>
+            <a:r>
+              <a:rPr lang="es-CL" dirty="0"/>
+              <a:t> -&gt; </a:t>
+            </a:r>
+            <a:r>
+              <a:rPr lang="es-CL" dirty="0" err="1"/>
+              <a:t>collapsed</a:t>
+            </a:r>
+            <a:r>
+              <a:rPr lang="es-CL" dirty="0"/>
+              <a:t> after 40K</a:t>
+            </a:r>
+            <a:endParaRPr lang="en-US" dirty="0"/>
+          </a:p>
+        </p:txBody>
+      </p:sp>
+      <p:pic>
+        <p:nvPicPr>
+          <p:cNvPr id="4" name="Imagen 3">
+            <a:extLst>
+              <a:ext uri="{FF2B5EF4-FFF2-40B4-BE49-F238E27FC236}">
+                <a16:creationId xmlns:a16="http://schemas.microsoft.com/office/drawing/2014/main" id="{0F55D21B-08FC-46E4-A9DB-B90115818ECB}"/>
+              </a:ext>
+            </a:extLst>
+          </p:cNvPr>
+          <p:cNvPicPr>
+            <a:picLocks noChangeAspect="1"/>
+          </p:cNvPicPr>
+          <p:nvPr/>
+        </p:nvPicPr>
+        <p:blipFill>
+          <a:blip r:embed="rId2"/>
+          <a:stretch>
+            <a:fillRect/>
+          </a:stretch>
+        </p:blipFill>
+        <p:spPr>
+          <a:xfrm>
+            <a:off x="1554162" y="1584324"/>
+            <a:ext cx="7870877" cy="4362451"/>
+          </a:xfrm>
+          <a:prstGeom prst="rect">
+            <a:avLst/>
+          </a:prstGeom>
+        </p:spPr>
+      </p:pic>
+    </p:spTree>
+    <p:extLst>
+      <p:ext uri="{BB962C8B-B14F-4D97-AF65-F5344CB8AC3E}">
+        <p14:creationId xmlns:p14="http://schemas.microsoft.com/office/powerpoint/2010/main" val="4085772938"/>
+      </p:ext>
+    </p:extLst>
+  </p:cSld>
+  <p:clrMapOvr>
+    <a:masterClrMapping/>
+  </p:clrMapOvr>
+</p:sld>
+</file>
+
 <file path=ppt/slides/slide2.xml><?xml version="1.0" encoding="utf-8"?>
 <p:sld xmlns:a="http://schemas.openxmlformats.org/drawingml/2006/main" xmlns:r="http://schemas.openxmlformats.org/officeDocument/2006/relationships" xmlns:p="http://schemas.openxmlformats.org/presentationml/2006/main">
   <p:cSld>
@@ -5006,6 +5424,10 @@
               <a:rPr lang="es-CL" b="1" dirty="0" err="1"/>
               <a:t>Consumer</a:t>
             </a:r>
+            <a:r>
+              <a:rPr lang="es-CL" b="1" dirty="0"/>
+              <a:t>  (local)</a:t>
+            </a:r>
             <a:endParaRPr lang="en-US" b="1" dirty="0"/>
           </a:p>
         </p:txBody>
@@ -5025,7 +5447,7 @@
         <p:spPr>
           <a:xfrm>
             <a:off x="9051234" y="5436930"/>
-            <a:ext cx="2493897" cy="184666"/>
+            <a:ext cx="2451653" cy="201870"/>
           </a:xfrm>
           <a:prstGeom prst="rect">
             <a:avLst/>
@@ -5073,10 +5495,811 @@
           </a:p>
         </p:txBody>
       </p:sp>
+      <p:sp>
+        <p:nvSpPr>
+          <p:cNvPr id="19" name="CuadroTexto 18">
+            <a:extLst>
+              <a:ext uri="{FF2B5EF4-FFF2-40B4-BE49-F238E27FC236}">
+                <a16:creationId xmlns:a16="http://schemas.microsoft.com/office/drawing/2014/main" id="{20D6BEC0-A334-4D0E-BE1D-6FFAD4370D04}"/>
+              </a:ext>
+            </a:extLst>
+          </p:cNvPr>
+          <p:cNvSpPr txBox="1"/>
+          <p:nvPr/>
+        </p:nvSpPr>
+        <p:spPr>
+          <a:xfrm>
+            <a:off x="6609937" y="1274504"/>
+            <a:ext cx="901700" cy="338554"/>
+          </a:xfrm>
+          <a:prstGeom prst="rect">
+            <a:avLst/>
+          </a:prstGeom>
+          <a:noFill/>
+        </p:spPr>
+        <p:txBody>
+          <a:bodyPr wrap="square">
+            <a:spAutoFit/>
+          </a:bodyPr>
+          <a:lstStyle/>
+          <a:p>
+            <a:r>
+              <a:rPr lang="es-CL" sz="1600" b="1" dirty="0"/>
+              <a:t>(local)</a:t>
+            </a:r>
+            <a:endParaRPr lang="en-US" sz="1600" dirty="0"/>
+          </a:p>
+        </p:txBody>
+      </p:sp>
+      <p:sp>
+        <p:nvSpPr>
+          <p:cNvPr id="20" name="CuadroTexto 19">
+            <a:extLst>
+              <a:ext uri="{FF2B5EF4-FFF2-40B4-BE49-F238E27FC236}">
+                <a16:creationId xmlns:a16="http://schemas.microsoft.com/office/drawing/2014/main" id="{716ACF64-90FA-4F9A-8957-5A5B5A8B6E49}"/>
+              </a:ext>
+            </a:extLst>
+          </p:cNvPr>
+          <p:cNvSpPr txBox="1"/>
+          <p:nvPr/>
+        </p:nvSpPr>
+        <p:spPr>
+          <a:xfrm>
+            <a:off x="1910937" y="1249104"/>
+            <a:ext cx="901700" cy="338554"/>
+          </a:xfrm>
+          <a:prstGeom prst="rect">
+            <a:avLst/>
+          </a:prstGeom>
+          <a:noFill/>
+        </p:spPr>
+        <p:txBody>
+          <a:bodyPr wrap="square">
+            <a:spAutoFit/>
+          </a:bodyPr>
+          <a:lstStyle/>
+          <a:p>
+            <a:r>
+              <a:rPr lang="es-CL" sz="1600" b="1" dirty="0"/>
+              <a:t>(local)</a:t>
+            </a:r>
+            <a:endParaRPr lang="en-US" sz="1600" dirty="0"/>
+          </a:p>
+        </p:txBody>
+      </p:sp>
     </p:spTree>
     <p:extLst>
       <p:ext uri="{BB962C8B-B14F-4D97-AF65-F5344CB8AC3E}">
         <p14:creationId xmlns:p14="http://schemas.microsoft.com/office/powerpoint/2010/main" val="3430296847"/>
+      </p:ext>
+    </p:extLst>
+  </p:cSld>
+  <p:clrMapOvr>
+    <a:masterClrMapping/>
+  </p:clrMapOvr>
+</p:sld>
+</file>
+
+<file path=ppt/slides/slide4.xml><?xml version="1.0" encoding="utf-8"?>
+<p:sld xmlns:a="http://schemas.openxmlformats.org/drawingml/2006/main" xmlns:r="http://schemas.openxmlformats.org/officeDocument/2006/relationships" xmlns:p="http://schemas.openxmlformats.org/presentationml/2006/main">
+  <p:cSld>
+    <p:spTree>
+      <p:nvGrpSpPr>
+        <p:cNvPr id="1" name=""/>
+        <p:cNvGrpSpPr/>
+        <p:nvPr/>
+      </p:nvGrpSpPr>
+      <p:grpSpPr>
+        <a:xfrm>
+          <a:off x="0" y="0"/>
+          <a:ext cx="0" cy="0"/>
+          <a:chOff x="0" y="0"/>
+          <a:chExt cx="0" cy="0"/>
+        </a:xfrm>
+      </p:grpSpPr>
+      <p:sp>
+        <p:nvSpPr>
+          <p:cNvPr id="2" name="Título 1">
+            <a:extLst>
+              <a:ext uri="{FF2B5EF4-FFF2-40B4-BE49-F238E27FC236}">
+                <a16:creationId xmlns:a16="http://schemas.microsoft.com/office/drawing/2014/main" id="{40369D93-2209-448E-86CD-1D15193BB598}"/>
+              </a:ext>
+            </a:extLst>
+          </p:cNvPr>
+          <p:cNvSpPr>
+            <a:spLocks noGrp="1"/>
+          </p:cNvSpPr>
+          <p:nvPr>
+            <p:ph type="title"/>
+          </p:nvPr>
+        </p:nvSpPr>
+        <p:spPr/>
+        <p:txBody>
+          <a:bodyPr/>
+          <a:lstStyle/>
+          <a:p>
+            <a:r>
+              <a:rPr lang="es-CL" dirty="0"/>
+              <a:t>Case 64 </a:t>
+            </a:r>
+            <a:r>
+              <a:rPr lang="es-CL" dirty="0" err="1"/>
+              <a:t>threads</a:t>
+            </a:r>
+            <a:r>
+              <a:rPr lang="es-CL" dirty="0"/>
+              <a:t> -&gt; 30 </a:t>
+            </a:r>
+            <a:r>
+              <a:rPr lang="es-CL" dirty="0" err="1"/>
+              <a:t>publishes</a:t>
+            </a:r>
+            <a:r>
+              <a:rPr lang="es-CL" dirty="0"/>
+              <a:t>/</a:t>
+            </a:r>
+            <a:r>
+              <a:rPr lang="es-CL" dirty="0" err="1"/>
+              <a:t>second</a:t>
+            </a:r>
+            <a:endParaRPr lang="en-US" dirty="0"/>
+          </a:p>
+        </p:txBody>
+      </p:sp>
+      <p:pic>
+        <p:nvPicPr>
+          <p:cNvPr id="4" name="Imagen 3">
+            <a:extLst>
+              <a:ext uri="{FF2B5EF4-FFF2-40B4-BE49-F238E27FC236}">
+                <a16:creationId xmlns:a16="http://schemas.microsoft.com/office/drawing/2014/main" id="{94BE3491-1347-453E-AF98-7F589BBD26FC}"/>
+              </a:ext>
+            </a:extLst>
+          </p:cNvPr>
+          <p:cNvPicPr>
+            <a:picLocks noChangeAspect="1"/>
+          </p:cNvPicPr>
+          <p:nvPr/>
+        </p:nvPicPr>
+        <p:blipFill>
+          <a:blip r:embed="rId2"/>
+          <a:stretch>
+            <a:fillRect/>
+          </a:stretch>
+        </p:blipFill>
+        <p:spPr>
+          <a:xfrm>
+            <a:off x="838200" y="1690688"/>
+            <a:ext cx="9905999" cy="4197969"/>
+          </a:xfrm>
+          <a:prstGeom prst="rect">
+            <a:avLst/>
+          </a:prstGeom>
+        </p:spPr>
+      </p:pic>
+    </p:spTree>
+    <p:extLst>
+      <p:ext uri="{BB962C8B-B14F-4D97-AF65-F5344CB8AC3E}">
+        <p14:creationId xmlns:p14="http://schemas.microsoft.com/office/powerpoint/2010/main" val="2534875582"/>
+      </p:ext>
+    </p:extLst>
+  </p:cSld>
+  <p:clrMapOvr>
+    <a:masterClrMapping/>
+  </p:clrMapOvr>
+</p:sld>
+</file>
+
+<file path=ppt/slides/slide5.xml><?xml version="1.0" encoding="utf-8"?>
+<p:sld xmlns:a="http://schemas.openxmlformats.org/drawingml/2006/main" xmlns:r="http://schemas.openxmlformats.org/officeDocument/2006/relationships" xmlns:p="http://schemas.openxmlformats.org/presentationml/2006/main">
+  <p:cSld>
+    <p:spTree>
+      <p:nvGrpSpPr>
+        <p:cNvPr id="1" name=""/>
+        <p:cNvGrpSpPr/>
+        <p:nvPr/>
+      </p:nvGrpSpPr>
+      <p:grpSpPr>
+        <a:xfrm>
+          <a:off x="0" y="0"/>
+          <a:ext cx="0" cy="0"/>
+          <a:chOff x="0" y="0"/>
+          <a:chExt cx="0" cy="0"/>
+        </a:xfrm>
+      </p:grpSpPr>
+      <p:pic>
+        <p:nvPicPr>
+          <p:cNvPr id="7" name="Imagen 6">
+            <a:extLst>
+              <a:ext uri="{FF2B5EF4-FFF2-40B4-BE49-F238E27FC236}">
+                <a16:creationId xmlns:a16="http://schemas.microsoft.com/office/drawing/2014/main" id="{6781D6BE-9114-4EB1-9394-925FEF3EF56F}"/>
+              </a:ext>
+            </a:extLst>
+          </p:cNvPr>
+          <p:cNvPicPr>
+            <a:picLocks noChangeAspect="1"/>
+          </p:cNvPicPr>
+          <p:nvPr/>
+        </p:nvPicPr>
+        <p:blipFill>
+          <a:blip r:embed="rId2"/>
+          <a:stretch>
+            <a:fillRect/>
+          </a:stretch>
+        </p:blipFill>
+        <p:spPr>
+          <a:xfrm>
+            <a:off x="838200" y="1929024"/>
+            <a:ext cx="9963149" cy="4357476"/>
+          </a:xfrm>
+          <a:prstGeom prst="rect">
+            <a:avLst/>
+          </a:prstGeom>
+        </p:spPr>
+      </p:pic>
+      <p:sp>
+        <p:nvSpPr>
+          <p:cNvPr id="9" name="Título 1">
+            <a:extLst>
+              <a:ext uri="{FF2B5EF4-FFF2-40B4-BE49-F238E27FC236}">
+                <a16:creationId xmlns:a16="http://schemas.microsoft.com/office/drawing/2014/main" id="{9533C53A-F112-4A5D-B53E-BA31F3497FB3}"/>
+              </a:ext>
+            </a:extLst>
+          </p:cNvPr>
+          <p:cNvSpPr txBox="1">
+            <a:spLocks/>
+          </p:cNvSpPr>
+          <p:nvPr/>
+        </p:nvSpPr>
+        <p:spPr>
+          <a:xfrm>
+            <a:off x="838200" y="441325"/>
+            <a:ext cx="10515600" cy="1325563"/>
+          </a:xfrm>
+          <a:prstGeom prst="rect">
+            <a:avLst/>
+          </a:prstGeom>
+        </p:spPr>
+        <p:txBody>
+          <a:bodyPr vert="horz" lIns="91440" tIns="45720" rIns="91440" bIns="45720" rtlCol="0" anchor="ctr">
+            <a:normAutofit/>
+          </a:bodyPr>
+          <a:lstStyle>
+            <a:lvl1pPr algn="l" defTabSz="914400" rtl="0" eaLnBrk="1" latinLnBrk="0" hangingPunct="1">
+              <a:lnSpc>
+                <a:spcPct val="90000"/>
+              </a:lnSpc>
+              <a:spcBef>
+                <a:spcPct val="0"/>
+              </a:spcBef>
+              <a:buNone/>
+              <a:defRPr sz="4400" kern="1200">
+                <a:solidFill>
+                  <a:schemeClr val="tx1"/>
+                </a:solidFill>
+                <a:latin typeface="+mj-lt"/>
+                <a:ea typeface="+mj-ea"/>
+                <a:cs typeface="+mj-cs"/>
+              </a:defRPr>
+            </a:lvl1pPr>
+          </a:lstStyle>
+          <a:p>
+            <a:r>
+              <a:rPr lang="es-CL" dirty="0"/>
+              <a:t>Case 64 </a:t>
+            </a:r>
+            <a:r>
+              <a:rPr lang="es-CL" dirty="0" err="1"/>
+              <a:t>threads</a:t>
+            </a:r>
+            <a:r>
+              <a:rPr lang="es-CL" dirty="0"/>
+              <a:t> -&gt; 40 </a:t>
+            </a:r>
+            <a:r>
+              <a:rPr lang="es-CL" dirty="0" err="1"/>
+              <a:t>mins</a:t>
+            </a:r>
+            <a:r>
+              <a:rPr lang="es-CL" dirty="0"/>
+              <a:t> </a:t>
+            </a:r>
+            <a:r>
+              <a:rPr lang="es-CL" dirty="0" err="1"/>
+              <a:t>to</a:t>
+            </a:r>
+            <a:r>
+              <a:rPr lang="es-CL" dirty="0"/>
+              <a:t> </a:t>
+            </a:r>
+            <a:r>
+              <a:rPr lang="es-CL" dirty="0" err="1"/>
+              <a:t>reach</a:t>
+            </a:r>
+            <a:r>
+              <a:rPr lang="es-CL" dirty="0"/>
+              <a:t> 70 k.</a:t>
+            </a:r>
+            <a:endParaRPr lang="en-US" dirty="0"/>
+          </a:p>
+        </p:txBody>
+      </p:sp>
+    </p:spTree>
+    <p:extLst>
+      <p:ext uri="{BB962C8B-B14F-4D97-AF65-F5344CB8AC3E}">
+        <p14:creationId xmlns:p14="http://schemas.microsoft.com/office/powerpoint/2010/main" val="1528902329"/>
+      </p:ext>
+    </p:extLst>
+  </p:cSld>
+  <p:clrMapOvr>
+    <a:masterClrMapping/>
+  </p:clrMapOvr>
+</p:sld>
+</file>
+
+<file path=ppt/slides/slide6.xml><?xml version="1.0" encoding="utf-8"?>
+<p:sld xmlns:a="http://schemas.openxmlformats.org/drawingml/2006/main" xmlns:r="http://schemas.openxmlformats.org/officeDocument/2006/relationships" xmlns:p="http://schemas.openxmlformats.org/presentationml/2006/main">
+  <p:cSld>
+    <p:spTree>
+      <p:nvGrpSpPr>
+        <p:cNvPr id="1" name=""/>
+        <p:cNvGrpSpPr/>
+        <p:nvPr/>
+      </p:nvGrpSpPr>
+      <p:grpSpPr>
+        <a:xfrm>
+          <a:off x="0" y="0"/>
+          <a:ext cx="0" cy="0"/>
+          <a:chOff x="0" y="0"/>
+          <a:chExt cx="0" cy="0"/>
+        </a:xfrm>
+      </p:grpSpPr>
+      <p:sp>
+        <p:nvSpPr>
+          <p:cNvPr id="2" name="Título 1">
+            <a:extLst>
+              <a:ext uri="{FF2B5EF4-FFF2-40B4-BE49-F238E27FC236}">
+                <a16:creationId xmlns:a16="http://schemas.microsoft.com/office/drawing/2014/main" id="{3F22CBB2-D1C4-4097-8E67-64AF78F8B0E5}"/>
+              </a:ext>
+            </a:extLst>
+          </p:cNvPr>
+          <p:cNvSpPr>
+            <a:spLocks noGrp="1"/>
+          </p:cNvSpPr>
+          <p:nvPr>
+            <p:ph type="title"/>
+          </p:nvPr>
+        </p:nvSpPr>
+        <p:spPr/>
+        <p:txBody>
+          <a:bodyPr/>
+          <a:lstStyle/>
+          <a:p>
+            <a:r>
+              <a:rPr lang="es-CL" dirty="0"/>
+              <a:t>Basic Consume </a:t>
+            </a:r>
+            <a:r>
+              <a:rPr lang="en-US" dirty="0"/>
+              <a:t>implementation</a:t>
+            </a:r>
+            <a:r>
+              <a:rPr lang="es-CL" dirty="0"/>
+              <a:t> </a:t>
+            </a:r>
+            <a:r>
+              <a:rPr lang="es-CL" dirty="0" err="1"/>
+              <a:t>working</a:t>
+            </a:r>
+            <a:r>
+              <a:rPr lang="es-CL" dirty="0"/>
+              <a:t> </a:t>
+            </a:r>
+            <a:r>
+              <a:rPr lang="en-US" dirty="0"/>
+              <a:t>erratically</a:t>
+            </a:r>
+          </a:p>
+        </p:txBody>
+      </p:sp>
+      <p:pic>
+        <p:nvPicPr>
+          <p:cNvPr id="4" name="Imagen 3">
+            <a:extLst>
+              <a:ext uri="{FF2B5EF4-FFF2-40B4-BE49-F238E27FC236}">
+                <a16:creationId xmlns:a16="http://schemas.microsoft.com/office/drawing/2014/main" id="{404939C2-5AA1-43BA-BAF5-834C79E5725F}"/>
+              </a:ext>
+            </a:extLst>
+          </p:cNvPr>
+          <p:cNvPicPr>
+            <a:picLocks noChangeAspect="1"/>
+          </p:cNvPicPr>
+          <p:nvPr/>
+        </p:nvPicPr>
+        <p:blipFill>
+          <a:blip r:embed="rId2"/>
+          <a:stretch>
+            <a:fillRect/>
+          </a:stretch>
+        </p:blipFill>
+        <p:spPr>
+          <a:xfrm>
+            <a:off x="838200" y="2387970"/>
+            <a:ext cx="10436634" cy="3923930"/>
+          </a:xfrm>
+          <a:prstGeom prst="rect">
+            <a:avLst/>
+          </a:prstGeom>
+        </p:spPr>
+      </p:pic>
+    </p:spTree>
+    <p:extLst>
+      <p:ext uri="{BB962C8B-B14F-4D97-AF65-F5344CB8AC3E}">
+        <p14:creationId xmlns:p14="http://schemas.microsoft.com/office/powerpoint/2010/main" val="2985624365"/>
+      </p:ext>
+    </p:extLst>
+  </p:cSld>
+  <p:clrMapOvr>
+    <a:masterClrMapping/>
+  </p:clrMapOvr>
+</p:sld>
+</file>
+
+<file path=ppt/slides/slide7.xml><?xml version="1.0" encoding="utf-8"?>
+<p:sld xmlns:a="http://schemas.openxmlformats.org/drawingml/2006/main" xmlns:r="http://schemas.openxmlformats.org/officeDocument/2006/relationships" xmlns:p="http://schemas.openxmlformats.org/presentationml/2006/main">
+  <p:cSld>
+    <p:spTree>
+      <p:nvGrpSpPr>
+        <p:cNvPr id="1" name=""/>
+        <p:cNvGrpSpPr/>
+        <p:nvPr/>
+      </p:nvGrpSpPr>
+      <p:grpSpPr>
+        <a:xfrm>
+          <a:off x="0" y="0"/>
+          <a:ext cx="0" cy="0"/>
+          <a:chOff x="0" y="0"/>
+          <a:chExt cx="0" cy="0"/>
+        </a:xfrm>
+      </p:grpSpPr>
+      <p:sp>
+        <p:nvSpPr>
+          <p:cNvPr id="2" name="Título 1">
+            <a:extLst>
+              <a:ext uri="{FF2B5EF4-FFF2-40B4-BE49-F238E27FC236}">
+                <a16:creationId xmlns:a16="http://schemas.microsoft.com/office/drawing/2014/main" id="{40369D93-2209-448E-86CD-1D15193BB598}"/>
+              </a:ext>
+            </a:extLst>
+          </p:cNvPr>
+          <p:cNvSpPr>
+            <a:spLocks noGrp="1"/>
+          </p:cNvSpPr>
+          <p:nvPr>
+            <p:ph type="title"/>
+          </p:nvPr>
+        </p:nvSpPr>
+        <p:spPr/>
+        <p:txBody>
+          <a:bodyPr/>
+          <a:lstStyle/>
+          <a:p>
+            <a:r>
+              <a:rPr lang="es-CL" dirty="0"/>
+              <a:t>Case 128 </a:t>
+            </a:r>
+            <a:r>
+              <a:rPr lang="es-CL" dirty="0" err="1"/>
+              <a:t>threads</a:t>
+            </a:r>
+            <a:r>
+              <a:rPr lang="es-CL" dirty="0"/>
+              <a:t> -&gt; 47 </a:t>
+            </a:r>
+            <a:r>
+              <a:rPr lang="es-CL" dirty="0" err="1"/>
+              <a:t>publishes</a:t>
+            </a:r>
+            <a:r>
+              <a:rPr lang="es-CL" dirty="0"/>
+              <a:t>/</a:t>
+            </a:r>
+            <a:r>
+              <a:rPr lang="es-CL" dirty="0" err="1"/>
+              <a:t>second</a:t>
+            </a:r>
+            <a:endParaRPr lang="en-US" dirty="0"/>
+          </a:p>
+        </p:txBody>
+      </p:sp>
+      <p:pic>
+        <p:nvPicPr>
+          <p:cNvPr id="8" name="Imagen 7">
+            <a:extLst>
+              <a:ext uri="{FF2B5EF4-FFF2-40B4-BE49-F238E27FC236}">
+                <a16:creationId xmlns:a16="http://schemas.microsoft.com/office/drawing/2014/main" id="{1A159465-1560-468C-95A5-7F2CAA857780}"/>
+              </a:ext>
+            </a:extLst>
+          </p:cNvPr>
+          <p:cNvPicPr>
+            <a:picLocks noChangeAspect="1"/>
+          </p:cNvPicPr>
+          <p:nvPr/>
+        </p:nvPicPr>
+        <p:blipFill>
+          <a:blip r:embed="rId2"/>
+          <a:stretch>
+            <a:fillRect/>
+          </a:stretch>
+        </p:blipFill>
+        <p:spPr>
+          <a:xfrm>
+            <a:off x="1231900" y="1516315"/>
+            <a:ext cx="8191500" cy="5083830"/>
+          </a:xfrm>
+          <a:prstGeom prst="rect">
+            <a:avLst/>
+          </a:prstGeom>
+        </p:spPr>
+      </p:pic>
+    </p:spTree>
+    <p:extLst>
+      <p:ext uri="{BB962C8B-B14F-4D97-AF65-F5344CB8AC3E}">
+        <p14:creationId xmlns:p14="http://schemas.microsoft.com/office/powerpoint/2010/main" val="912092784"/>
+      </p:ext>
+    </p:extLst>
+  </p:cSld>
+  <p:clrMapOvr>
+    <a:masterClrMapping/>
+  </p:clrMapOvr>
+</p:sld>
+</file>
+
+<file path=ppt/slides/slide8.xml><?xml version="1.0" encoding="utf-8"?>
+<p:sld xmlns:a="http://schemas.openxmlformats.org/drawingml/2006/main" xmlns:r="http://schemas.openxmlformats.org/officeDocument/2006/relationships" xmlns:p="http://schemas.openxmlformats.org/presentationml/2006/main">
+  <p:cSld>
+    <p:spTree>
+      <p:nvGrpSpPr>
+        <p:cNvPr id="1" name=""/>
+        <p:cNvGrpSpPr/>
+        <p:nvPr/>
+      </p:nvGrpSpPr>
+      <p:grpSpPr>
+        <a:xfrm>
+          <a:off x="0" y="0"/>
+          <a:ext cx="0" cy="0"/>
+          <a:chOff x="0" y="0"/>
+          <a:chExt cx="0" cy="0"/>
+        </a:xfrm>
+      </p:grpSpPr>
+      <p:sp>
+        <p:nvSpPr>
+          <p:cNvPr id="9" name="Título 1">
+            <a:extLst>
+              <a:ext uri="{FF2B5EF4-FFF2-40B4-BE49-F238E27FC236}">
+                <a16:creationId xmlns:a16="http://schemas.microsoft.com/office/drawing/2014/main" id="{9533C53A-F112-4A5D-B53E-BA31F3497FB3}"/>
+              </a:ext>
+            </a:extLst>
+          </p:cNvPr>
+          <p:cNvSpPr txBox="1">
+            <a:spLocks/>
+          </p:cNvSpPr>
+          <p:nvPr/>
+        </p:nvSpPr>
+        <p:spPr>
+          <a:xfrm>
+            <a:off x="838200" y="441325"/>
+            <a:ext cx="10515600" cy="1325563"/>
+          </a:xfrm>
+          <a:prstGeom prst="rect">
+            <a:avLst/>
+          </a:prstGeom>
+        </p:spPr>
+        <p:txBody>
+          <a:bodyPr vert="horz" lIns="91440" tIns="45720" rIns="91440" bIns="45720" rtlCol="0" anchor="ctr">
+            <a:normAutofit/>
+          </a:bodyPr>
+          <a:lstStyle>
+            <a:lvl1pPr algn="l" defTabSz="914400" rtl="0" eaLnBrk="1" latinLnBrk="0" hangingPunct="1">
+              <a:lnSpc>
+                <a:spcPct val="90000"/>
+              </a:lnSpc>
+              <a:spcBef>
+                <a:spcPct val="0"/>
+              </a:spcBef>
+              <a:buNone/>
+              <a:defRPr sz="4400" kern="1200">
+                <a:solidFill>
+                  <a:schemeClr val="tx1"/>
+                </a:solidFill>
+                <a:latin typeface="+mj-lt"/>
+                <a:ea typeface="+mj-ea"/>
+                <a:cs typeface="+mj-cs"/>
+              </a:defRPr>
+            </a:lvl1pPr>
+          </a:lstStyle>
+          <a:p>
+            <a:r>
+              <a:rPr lang="es-CL" dirty="0"/>
+              <a:t>Case 128 </a:t>
+            </a:r>
+            <a:r>
+              <a:rPr lang="es-CL" dirty="0" err="1"/>
+              <a:t>threads</a:t>
+            </a:r>
+            <a:r>
+              <a:rPr lang="es-CL" dirty="0"/>
+              <a:t> -&gt; 25 </a:t>
+            </a:r>
+            <a:r>
+              <a:rPr lang="es-CL" dirty="0" err="1"/>
+              <a:t>mins</a:t>
+            </a:r>
+            <a:r>
+              <a:rPr lang="es-CL" dirty="0"/>
+              <a:t> </a:t>
+            </a:r>
+            <a:r>
+              <a:rPr lang="es-CL" dirty="0" err="1"/>
+              <a:t>to</a:t>
+            </a:r>
+            <a:r>
+              <a:rPr lang="es-CL" dirty="0"/>
+              <a:t> </a:t>
+            </a:r>
+            <a:r>
+              <a:rPr lang="es-CL" dirty="0" err="1"/>
+              <a:t>reach</a:t>
+            </a:r>
+            <a:r>
+              <a:rPr lang="es-CL" dirty="0"/>
+              <a:t> 70 k.</a:t>
+            </a:r>
+            <a:endParaRPr lang="en-US" dirty="0"/>
+          </a:p>
+        </p:txBody>
+      </p:sp>
+      <p:pic>
+        <p:nvPicPr>
+          <p:cNvPr id="11" name="Imagen 10">
+            <a:extLst>
+              <a:ext uri="{FF2B5EF4-FFF2-40B4-BE49-F238E27FC236}">
+                <a16:creationId xmlns:a16="http://schemas.microsoft.com/office/drawing/2014/main" id="{A95A7214-CF17-4F03-9941-4189B8055374}"/>
+              </a:ext>
+            </a:extLst>
+          </p:cNvPr>
+          <p:cNvPicPr>
+            <a:picLocks noChangeAspect="1"/>
+          </p:cNvPicPr>
+          <p:nvPr/>
+        </p:nvPicPr>
+        <p:blipFill>
+          <a:blip r:embed="rId2"/>
+          <a:stretch>
+            <a:fillRect/>
+          </a:stretch>
+        </p:blipFill>
+        <p:spPr>
+          <a:xfrm>
+            <a:off x="1219200" y="1766888"/>
+            <a:ext cx="9145587" cy="4758469"/>
+          </a:xfrm>
+          <a:prstGeom prst="rect">
+            <a:avLst/>
+          </a:prstGeom>
+        </p:spPr>
+      </p:pic>
+    </p:spTree>
+    <p:extLst>
+      <p:ext uri="{BB962C8B-B14F-4D97-AF65-F5344CB8AC3E}">
+        <p14:creationId xmlns:p14="http://schemas.microsoft.com/office/powerpoint/2010/main" val="3016042470"/>
+      </p:ext>
+    </p:extLst>
+  </p:cSld>
+  <p:clrMapOvr>
+    <a:masterClrMapping/>
+  </p:clrMapOvr>
+</p:sld>
+</file>
+
+<file path=ppt/slides/slide9.xml><?xml version="1.0" encoding="utf-8"?>
+<p:sld xmlns:a="http://schemas.openxmlformats.org/drawingml/2006/main" xmlns:r="http://schemas.openxmlformats.org/officeDocument/2006/relationships" xmlns:p="http://schemas.openxmlformats.org/presentationml/2006/main">
+  <p:cSld>
+    <p:spTree>
+      <p:nvGrpSpPr>
+        <p:cNvPr id="1" name=""/>
+        <p:cNvGrpSpPr/>
+        <p:nvPr/>
+      </p:nvGrpSpPr>
+      <p:grpSpPr>
+        <a:xfrm>
+          <a:off x="0" y="0"/>
+          <a:ext cx="0" cy="0"/>
+          <a:chOff x="0" y="0"/>
+          <a:chExt cx="0" cy="0"/>
+        </a:xfrm>
+      </p:grpSpPr>
+      <p:sp>
+        <p:nvSpPr>
+          <p:cNvPr id="2" name="Título 1">
+            <a:extLst>
+              <a:ext uri="{FF2B5EF4-FFF2-40B4-BE49-F238E27FC236}">
+                <a16:creationId xmlns:a16="http://schemas.microsoft.com/office/drawing/2014/main" id="{40369D93-2209-448E-86CD-1D15193BB598}"/>
+              </a:ext>
+            </a:extLst>
+          </p:cNvPr>
+          <p:cNvSpPr>
+            <a:spLocks noGrp="1"/>
+          </p:cNvSpPr>
+          <p:nvPr>
+            <p:ph type="title"/>
+          </p:nvPr>
+        </p:nvSpPr>
+        <p:spPr/>
+        <p:txBody>
+          <a:bodyPr/>
+          <a:lstStyle/>
+          <a:p>
+            <a:r>
+              <a:rPr lang="es-CL" dirty="0"/>
+              <a:t>Case 256 </a:t>
+            </a:r>
+            <a:r>
+              <a:rPr lang="es-CL" dirty="0" err="1"/>
+              <a:t>threads</a:t>
+            </a:r>
+            <a:r>
+              <a:rPr lang="es-CL" dirty="0"/>
+              <a:t> -&gt; 58 </a:t>
+            </a:r>
+            <a:r>
+              <a:rPr lang="es-CL" dirty="0" err="1"/>
+              <a:t>publishes</a:t>
+            </a:r>
+            <a:r>
+              <a:rPr lang="es-CL" dirty="0"/>
+              <a:t>/</a:t>
+            </a:r>
+            <a:r>
+              <a:rPr lang="es-CL" dirty="0" err="1"/>
+              <a:t>second</a:t>
+            </a:r>
+            <a:endParaRPr lang="en-US" dirty="0"/>
+          </a:p>
+        </p:txBody>
+      </p:sp>
+      <p:pic>
+        <p:nvPicPr>
+          <p:cNvPr id="5" name="Imagen 4">
+            <a:extLst>
+              <a:ext uri="{FF2B5EF4-FFF2-40B4-BE49-F238E27FC236}">
+                <a16:creationId xmlns:a16="http://schemas.microsoft.com/office/drawing/2014/main" id="{8969987D-9132-4DE3-B4B3-7049CF0BB5E2}"/>
+              </a:ext>
+            </a:extLst>
+          </p:cNvPr>
+          <p:cNvPicPr>
+            <a:picLocks noChangeAspect="1"/>
+          </p:cNvPicPr>
+          <p:nvPr/>
+        </p:nvPicPr>
+        <p:blipFill>
+          <a:blip r:embed="rId2"/>
+          <a:stretch>
+            <a:fillRect/>
+          </a:stretch>
+        </p:blipFill>
+        <p:spPr>
+          <a:xfrm>
+            <a:off x="717550" y="1327150"/>
+            <a:ext cx="10077450" cy="5343525"/>
+          </a:xfrm>
+          <a:prstGeom prst="rect">
+            <a:avLst/>
+          </a:prstGeom>
+        </p:spPr>
+      </p:pic>
+    </p:spTree>
+    <p:extLst>
+      <p:ext uri="{BB962C8B-B14F-4D97-AF65-F5344CB8AC3E}">
+        <p14:creationId xmlns:p14="http://schemas.microsoft.com/office/powerpoint/2010/main" val="2222283901"/>
       </p:ext>
     </p:extLst>
   </p:cSld>

</xml_diff>